<commit_message>
minor changes in Swate-Demo
</commit_message>
<xml_diff>
--- a/src/docs/img/Swate_a_Overview.pptx
+++ b/src/docs/img/Swate_a_Overview.pptx
@@ -6,6 +6,7 @@
   </p:sldMasterIdLst>
   <p:sldIdLst>
     <p:sldId id="256" r:id="rId2"/>
+    <p:sldId id="257" r:id="rId3"/>
   </p:sldIdLst>
   <p:sldSz cx="12192000" cy="6858000"/>
   <p:notesSz cx="6858000" cy="9144000"/>
@@ -4059,6 +4060,185 @@
 </p:sld>
 </file>
 
+<file path=ppt/slides/slide2.xml><?xml version="1.0" encoding="utf-8"?>
+<p:sld xmlns:a="http://schemas.openxmlformats.org/drawingml/2006/main" xmlns:r="http://schemas.openxmlformats.org/officeDocument/2006/relationships" xmlns:p="http://schemas.openxmlformats.org/presentationml/2006/main">
+  <p:cSld>
+    <p:spTree>
+      <p:nvGrpSpPr>
+        <p:cNvPr id="1" name=""/>
+        <p:cNvGrpSpPr/>
+        <p:nvPr/>
+      </p:nvGrpSpPr>
+      <p:grpSpPr>
+        <a:xfrm>
+          <a:off x="0" y="0"/>
+          <a:ext cx="0" cy="0"/>
+          <a:chOff x="0" y="0"/>
+          <a:chExt cx="0" cy="0"/>
+        </a:xfrm>
+      </p:grpSpPr>
+      <p:grpSp>
+        <p:nvGrpSpPr>
+          <p:cNvPr id="4" name="Gruppieren 3">
+            <a:extLst>
+              <a:ext uri="{FF2B5EF4-FFF2-40B4-BE49-F238E27FC236}">
+                <a16:creationId xmlns:a16="http://schemas.microsoft.com/office/drawing/2014/main" id="{53BC6D1D-2D8E-4711-AF28-0128E77D1DFE}"/>
+              </a:ext>
+            </a:extLst>
+          </p:cNvPr>
+          <p:cNvGrpSpPr/>
+          <p:nvPr/>
+        </p:nvGrpSpPr>
+        <p:grpSpPr>
+          <a:xfrm>
+            <a:off x="0" y="1043191"/>
+            <a:ext cx="12192000" cy="5439899"/>
+            <a:chOff x="0" y="1043191"/>
+            <a:chExt cx="12192000" cy="5439899"/>
+          </a:xfrm>
+        </p:grpSpPr>
+        <p:pic>
+          <p:nvPicPr>
+            <p:cNvPr id="5" name="Grafik 4">
+              <a:extLst>
+                <a:ext uri="{FF2B5EF4-FFF2-40B4-BE49-F238E27FC236}">
+                  <a16:creationId xmlns:a16="http://schemas.microsoft.com/office/drawing/2014/main" id="{B724DEF5-13A8-40DB-A72C-CC9C9624826D}"/>
+                </a:ext>
+              </a:extLst>
+            </p:cNvPr>
+            <p:cNvPicPr>
+              <a:picLocks noChangeAspect="1"/>
+            </p:cNvPicPr>
+            <p:nvPr/>
+          </p:nvPicPr>
+          <p:blipFill>
+            <a:blip r:embed="rId2">
+              <a:extLst>
+                <a:ext uri="{28A0092B-C50C-407E-A947-70E740481C1C}">
+                  <a14:useLocalDpi xmlns:a14="http://schemas.microsoft.com/office/drawing/2010/main" val="0"/>
+                </a:ext>
+              </a:extLst>
+            </a:blip>
+            <a:stretch>
+              <a:fillRect/>
+            </a:stretch>
+          </p:blipFill>
+          <p:spPr>
+            <a:xfrm>
+              <a:off x="0" y="1043191"/>
+              <a:ext cx="12192000" cy="5439899"/>
+            </a:xfrm>
+            <a:prstGeom prst="rect">
+              <a:avLst/>
+            </a:prstGeom>
+          </p:spPr>
+        </p:pic>
+        <p:sp>
+          <p:nvSpPr>
+            <p:cNvPr id="10" name="Textfeld 9">
+              <a:extLst>
+                <a:ext uri="{FF2B5EF4-FFF2-40B4-BE49-F238E27FC236}">
+                  <a16:creationId xmlns:a16="http://schemas.microsoft.com/office/drawing/2014/main" id="{F3AA05D2-FA30-4328-B092-B5CD97362508}"/>
+                </a:ext>
+              </a:extLst>
+            </p:cNvPr>
+            <p:cNvSpPr txBox="1"/>
+            <p:nvPr/>
+          </p:nvSpPr>
+          <p:spPr>
+            <a:xfrm>
+              <a:off x="6772276" y="1400145"/>
+              <a:ext cx="2666692" cy="400110"/>
+            </a:xfrm>
+            <a:prstGeom prst="rect">
+              <a:avLst/>
+            </a:prstGeom>
+          </p:spPr>
+          <p:style>
+            <a:lnRef idx="1">
+              <a:schemeClr val="accent1"/>
+            </a:lnRef>
+            <a:fillRef idx="2">
+              <a:schemeClr val="accent1"/>
+            </a:fillRef>
+            <a:effectRef idx="1">
+              <a:schemeClr val="accent1"/>
+            </a:effectRef>
+            <a:fontRef idx="minor">
+              <a:schemeClr val="dk1"/>
+            </a:fontRef>
+          </p:style>
+          <p:txBody>
+            <a:bodyPr wrap="square" rtlCol="0">
+              <a:spAutoFit/>
+            </a:bodyPr>
+            <a:lstStyle/>
+            <a:p>
+              <a:pPr algn="ctr"/>
+              <a:r>
+                <a:rPr lang="de-DE" sz="2000" b="1" dirty="0"/>
+                <a:t>New building blocks</a:t>
+              </a:r>
+              <a:endParaRPr lang="en-GB" sz="2000" b="1" dirty="0"/>
+            </a:p>
+          </p:txBody>
+        </p:sp>
+        <p:cxnSp>
+          <p:nvCxnSpPr>
+            <p:cNvPr id="29" name="Verbinder: gekrümmt 28">
+              <a:extLst>
+                <a:ext uri="{FF2B5EF4-FFF2-40B4-BE49-F238E27FC236}">
+                  <a16:creationId xmlns:a16="http://schemas.microsoft.com/office/drawing/2014/main" id="{534746FD-D85C-4A88-AE96-8F09AA12E9DA}"/>
+                </a:ext>
+              </a:extLst>
+            </p:cNvPr>
+            <p:cNvCxnSpPr>
+              <a:cxnSpLocks/>
+              <a:stCxn id="10" idx="2"/>
+            </p:cNvCxnSpPr>
+            <p:nvPr/>
+          </p:nvCxnSpPr>
+          <p:spPr>
+            <a:xfrm rot="5400000">
+              <a:off x="7419918" y="1428845"/>
+              <a:ext cx="314294" cy="1057115"/>
+            </a:xfrm>
+            <a:prstGeom prst="curvedConnector2">
+              <a:avLst/>
+            </a:prstGeom>
+            <a:ln>
+              <a:tailEnd type="triangle"/>
+            </a:ln>
+          </p:spPr>
+          <p:style>
+            <a:lnRef idx="3">
+              <a:schemeClr val="dk1"/>
+            </a:lnRef>
+            <a:fillRef idx="0">
+              <a:schemeClr val="dk1"/>
+            </a:fillRef>
+            <a:effectRef idx="2">
+              <a:schemeClr val="dk1"/>
+            </a:effectRef>
+            <a:fontRef idx="minor">
+              <a:schemeClr val="tx1"/>
+            </a:fontRef>
+          </p:style>
+        </p:cxnSp>
+      </p:grpSp>
+    </p:spTree>
+    <p:extLst>
+      <p:ext uri="{BB962C8B-B14F-4D97-AF65-F5344CB8AC3E}">
+        <p14:creationId xmlns:p14="http://schemas.microsoft.com/office/powerpoint/2010/main" val="1863521462"/>
+      </p:ext>
+    </p:extLst>
+  </p:cSld>
+  <p:clrMapOvr>
+    <a:masterClrMapping/>
+  </p:clrMapOvr>
+</p:sld>
+</file>
+
 <file path=ppt/theme/theme1.xml><?xml version="1.0" encoding="utf-8"?>
 <a:theme xmlns:a="http://schemas.openxmlformats.org/drawingml/2006/main" name="Office">
   <a:themeElements>

</xml_diff>